<commit_message>
Updated Statistical Analysis with 4 Parameter ANOVA
</commit_message>
<xml_diff>
--- a/Statistical Analysis/Segmented Statistical Results.pptx
+++ b/Statistical Analysis/Segmented Statistical Results.pptx
@@ -5,10 +5,10 @@
     <p:sldMasterId id="2147483696" r:id="rId4"/>
   </p:sldMasterIdLst>
   <p:notesMasterIdLst>
-    <p:notesMasterId r:id="rId30"/>
+    <p:notesMasterId r:id="rId52"/>
   </p:notesMasterIdLst>
   <p:handoutMasterIdLst>
-    <p:handoutMasterId r:id="rId31"/>
+    <p:handoutMasterId r:id="rId53"/>
   </p:handoutMasterIdLst>
   <p:sldIdLst>
     <p:sldId id="334" r:id="rId5"/>
@@ -36,6 +36,28 @@
     <p:sldId id="383" r:id="rId27"/>
     <p:sldId id="390" r:id="rId28"/>
     <p:sldId id="392" r:id="rId29"/>
+    <p:sldId id="393" r:id="rId30"/>
+    <p:sldId id="401" r:id="rId31"/>
+    <p:sldId id="402" r:id="rId32"/>
+    <p:sldId id="403" r:id="rId33"/>
+    <p:sldId id="404" r:id="rId34"/>
+    <p:sldId id="405" r:id="rId35"/>
+    <p:sldId id="406" r:id="rId36"/>
+    <p:sldId id="407" r:id="rId37"/>
+    <p:sldId id="398" r:id="rId38"/>
+    <p:sldId id="394" r:id="rId39"/>
+    <p:sldId id="395" r:id="rId40"/>
+    <p:sldId id="396" r:id="rId41"/>
+    <p:sldId id="397" r:id="rId42"/>
+    <p:sldId id="399" r:id="rId43"/>
+    <p:sldId id="400" r:id="rId44"/>
+    <p:sldId id="408" r:id="rId45"/>
+    <p:sldId id="409" r:id="rId46"/>
+    <p:sldId id="410" r:id="rId47"/>
+    <p:sldId id="411" r:id="rId48"/>
+    <p:sldId id="412" r:id="rId49"/>
+    <p:sldId id="413" r:id="rId50"/>
+    <p:sldId id="414" r:id="rId51"/>
   </p:sldIdLst>
   <p:sldSz cx="12192000" cy="6858000"/>
   <p:notesSz cx="6858000" cy="9144000"/>
@@ -178,6 +200,32 @@
             <p14:sldId id="392"/>
           </p14:sldIdLst>
         </p14:section>
+        <p14:section name="4 Parameter Models" id="{DA461985-8E5D-4623-B71B-2AB64E350BCB}">
+          <p14:sldIdLst>
+            <p14:sldId id="393"/>
+            <p14:sldId id="401"/>
+            <p14:sldId id="402"/>
+            <p14:sldId id="403"/>
+            <p14:sldId id="404"/>
+            <p14:sldId id="405"/>
+            <p14:sldId id="406"/>
+            <p14:sldId id="407"/>
+            <p14:sldId id="398"/>
+            <p14:sldId id="394"/>
+            <p14:sldId id="395"/>
+            <p14:sldId id="396"/>
+            <p14:sldId id="397"/>
+            <p14:sldId id="399"/>
+            <p14:sldId id="400"/>
+            <p14:sldId id="408"/>
+            <p14:sldId id="409"/>
+            <p14:sldId id="410"/>
+            <p14:sldId id="411"/>
+            <p14:sldId id="412"/>
+            <p14:sldId id="413"/>
+            <p14:sldId id="414"/>
+          </p14:sldIdLst>
+        </p14:section>
       </p14:sectionLst>
     </p:ext>
     <p:ext uri="{EFAFB233-063F-42B5-8137-9DF3F51BA10A}">
@@ -306,7 +354,7 @@
           <a:p>
             <a:fld id="{A3888634-FBA9-41D6-8B35-EE3A7D816B7C}" type="datetimeFigureOut">
               <a:rPr lang="en-US" smtClean="0"/>
-              <a:t>1/29/2025</a:t>
+              <a:t>1/31/2025</a:t>
             </a:fld>
             <a:endParaRPr lang="en-US" dirty="0"/>
           </a:p>
@@ -483,7 +531,7 @@
           <a:p>
             <a:fld id="{5EA28068-AFBD-4979-B752-9EB6F90B1386}" type="datetimeFigureOut">
               <a:rPr lang="en-US" smtClean="0"/>
-              <a:t>1/29/2025</a:t>
+              <a:t>1/31/2025</a:t>
             </a:fld>
             <a:endParaRPr lang="en-US" dirty="0"/>
           </a:p>
@@ -12298,6 +12346,476 @@
 </p:sld>
 </file>
 
+<file path=ppt/slides/slide26.xml><?xml version="1.0" encoding="utf-8"?>
+<p:sld xmlns:a="http://schemas.openxmlformats.org/drawingml/2006/main" xmlns:r="http://schemas.openxmlformats.org/officeDocument/2006/relationships" xmlns:p="http://schemas.openxmlformats.org/presentationml/2006/main">
+  <p:cSld>
+    <p:spTree>
+      <p:nvGrpSpPr>
+        <p:cNvPr id="1" name=""/>
+        <p:cNvGrpSpPr/>
+        <p:nvPr/>
+      </p:nvGrpSpPr>
+      <p:grpSpPr>
+        <a:xfrm>
+          <a:off x="0" y="0"/>
+          <a:ext cx="0" cy="0"/>
+          <a:chOff x="0" y="0"/>
+          <a:chExt cx="0" cy="0"/>
+        </a:xfrm>
+      </p:grpSpPr>
+      <p:sp>
+        <p:nvSpPr>
+          <p:cNvPr id="2" name="Title 1">
+            <a:extLst>
+              <a:ext uri="{FF2B5EF4-FFF2-40B4-BE49-F238E27FC236}">
+                <a16:creationId xmlns:a16="http://schemas.microsoft.com/office/drawing/2014/main" id="{4B9E6BA8-AEC6-9BD3-0E34-0572107044EB}"/>
+              </a:ext>
+            </a:extLst>
+          </p:cNvPr>
+          <p:cNvSpPr>
+            <a:spLocks noGrp="1"/>
+          </p:cNvSpPr>
+          <p:nvPr>
+            <p:ph type="ctrTitle"/>
+          </p:nvPr>
+        </p:nvSpPr>
+        <p:spPr/>
+        <p:txBody>
+          <a:bodyPr/>
+          <a:lstStyle/>
+          <a:p>
+            <a:endParaRPr lang="en-US"/>
+          </a:p>
+        </p:txBody>
+      </p:sp>
+      <p:sp>
+        <p:nvSpPr>
+          <p:cNvPr id="3" name="Subtitle 2">
+            <a:extLst>
+              <a:ext uri="{FF2B5EF4-FFF2-40B4-BE49-F238E27FC236}">
+                <a16:creationId xmlns:a16="http://schemas.microsoft.com/office/drawing/2014/main" id="{D2369DA5-0C18-5D85-14F7-74242B68458C}"/>
+              </a:ext>
+            </a:extLst>
+          </p:cNvPr>
+          <p:cNvSpPr>
+            <a:spLocks noGrp="1"/>
+          </p:cNvSpPr>
+          <p:nvPr>
+            <p:ph type="subTitle" idx="1"/>
+          </p:nvPr>
+        </p:nvSpPr>
+        <p:spPr/>
+        <p:txBody>
+          <a:bodyPr/>
+          <a:lstStyle/>
+          <a:p>
+            <a:endParaRPr lang="en-US"/>
+          </a:p>
+        </p:txBody>
+      </p:sp>
+    </p:spTree>
+    <p:extLst>
+      <p:ext uri="{BB962C8B-B14F-4D97-AF65-F5344CB8AC3E}">
+        <p14:creationId xmlns:p14="http://schemas.microsoft.com/office/powerpoint/2010/main" val="4286829056"/>
+      </p:ext>
+    </p:extLst>
+  </p:cSld>
+  <p:clrMapOvr>
+    <a:masterClrMapping/>
+  </p:clrMapOvr>
+</p:sld>
+</file>
+
+<file path=ppt/slides/slide27.xml><?xml version="1.0" encoding="utf-8"?>
+<p:sld xmlns:a="http://schemas.openxmlformats.org/drawingml/2006/main" xmlns:r="http://schemas.openxmlformats.org/officeDocument/2006/relationships" xmlns:p="http://schemas.openxmlformats.org/presentationml/2006/main">
+  <p:cSld>
+    <p:spTree>
+      <p:nvGrpSpPr>
+        <p:cNvPr id="1" name=""/>
+        <p:cNvGrpSpPr/>
+        <p:nvPr/>
+      </p:nvGrpSpPr>
+      <p:grpSpPr>
+        <a:xfrm>
+          <a:off x="0" y="0"/>
+          <a:ext cx="0" cy="0"/>
+          <a:chOff x="0" y="0"/>
+          <a:chExt cx="0" cy="0"/>
+        </a:xfrm>
+      </p:grpSpPr>
+      <p:pic>
+        <p:nvPicPr>
+          <p:cNvPr id="2" name="Picture 1">
+            <a:extLst>
+              <a:ext uri="{FF2B5EF4-FFF2-40B4-BE49-F238E27FC236}">
+                <a16:creationId xmlns:a16="http://schemas.microsoft.com/office/drawing/2014/main" id="{627A444B-17C1-F2A2-7CA6-23E4A61C4AFF}"/>
+              </a:ext>
+            </a:extLst>
+          </p:cNvPr>
+          <p:cNvPicPr>
+            <a:picLocks noChangeAspect="1"/>
+          </p:cNvPicPr>
+          <p:nvPr/>
+        </p:nvPicPr>
+        <p:blipFill>
+          <a:blip r:embed="rId2"/>
+          <a:stretch>
+            <a:fillRect/>
+          </a:stretch>
+        </p:blipFill>
+        <p:spPr>
+          <a:xfrm>
+            <a:off x="63500" y="63500"/>
+            <a:ext cx="12192000" cy="484742"/>
+          </a:xfrm>
+          <a:prstGeom prst="rect">
+            <a:avLst/>
+          </a:prstGeom>
+        </p:spPr>
+      </p:pic>
+      <p:pic>
+        <p:nvPicPr>
+          <p:cNvPr id="3" name="Picture 2">
+            <a:extLst>
+              <a:ext uri="{FF2B5EF4-FFF2-40B4-BE49-F238E27FC236}">
+                <a16:creationId xmlns:a16="http://schemas.microsoft.com/office/drawing/2014/main" id="{208F5D8A-36BD-D59B-B3E4-D8B945350CA1}"/>
+              </a:ext>
+            </a:extLst>
+          </p:cNvPr>
+          <p:cNvPicPr>
+            <a:picLocks noChangeAspect="1"/>
+          </p:cNvPicPr>
+          <p:nvPr/>
+        </p:nvPicPr>
+        <p:blipFill>
+          <a:blip r:embed="rId3"/>
+          <a:stretch>
+            <a:fillRect/>
+          </a:stretch>
+        </p:blipFill>
+        <p:spPr>
+          <a:xfrm>
+            <a:off x="63500" y="611742"/>
+            <a:ext cx="4838700" cy="3171825"/>
+          </a:xfrm>
+          <a:prstGeom prst="rect">
+            <a:avLst/>
+          </a:prstGeom>
+        </p:spPr>
+      </p:pic>
+    </p:spTree>
+    <p:extLst>
+      <p:ext uri="{BB962C8B-B14F-4D97-AF65-F5344CB8AC3E}">
+        <p14:creationId xmlns:p14="http://schemas.microsoft.com/office/powerpoint/2010/main" val="559117696"/>
+      </p:ext>
+    </p:extLst>
+  </p:cSld>
+  <p:clrMapOvr>
+    <a:masterClrMapping/>
+  </p:clrMapOvr>
+</p:sld>
+</file>
+
+<file path=ppt/slides/slide28.xml><?xml version="1.0" encoding="utf-8"?>
+<p:sld xmlns:a="http://schemas.openxmlformats.org/drawingml/2006/main" xmlns:r="http://schemas.openxmlformats.org/officeDocument/2006/relationships" xmlns:p="http://schemas.openxmlformats.org/presentationml/2006/main">
+  <p:cSld>
+    <p:spTree>
+      <p:nvGrpSpPr>
+        <p:cNvPr id="1" name=""/>
+        <p:cNvGrpSpPr/>
+        <p:nvPr/>
+      </p:nvGrpSpPr>
+      <p:grpSpPr>
+        <a:xfrm>
+          <a:off x="0" y="0"/>
+          <a:ext cx="0" cy="0"/>
+          <a:chOff x="0" y="0"/>
+          <a:chExt cx="0" cy="0"/>
+        </a:xfrm>
+      </p:grpSpPr>
+      <p:pic>
+        <p:nvPicPr>
+          <p:cNvPr id="2" name="Picture 1">
+            <a:extLst>
+              <a:ext uri="{FF2B5EF4-FFF2-40B4-BE49-F238E27FC236}">
+                <a16:creationId xmlns:a16="http://schemas.microsoft.com/office/drawing/2014/main" id="{59B028BB-9F72-3ECA-DA53-A4A093FCEF03}"/>
+              </a:ext>
+            </a:extLst>
+          </p:cNvPr>
+          <p:cNvPicPr>
+            <a:picLocks noChangeAspect="1"/>
+          </p:cNvPicPr>
+          <p:nvPr/>
+        </p:nvPicPr>
+        <p:blipFill>
+          <a:blip r:embed="rId2"/>
+          <a:stretch>
+            <a:fillRect/>
+          </a:stretch>
+        </p:blipFill>
+        <p:spPr>
+          <a:xfrm>
+            <a:off x="63500" y="63500"/>
+            <a:ext cx="12192000" cy="484742"/>
+          </a:xfrm>
+          <a:prstGeom prst="rect">
+            <a:avLst/>
+          </a:prstGeom>
+        </p:spPr>
+      </p:pic>
+      <p:pic>
+        <p:nvPicPr>
+          <p:cNvPr id="3" name="Picture 2">
+            <a:extLst>
+              <a:ext uri="{FF2B5EF4-FFF2-40B4-BE49-F238E27FC236}">
+                <a16:creationId xmlns:a16="http://schemas.microsoft.com/office/drawing/2014/main" id="{8B18A67E-04DB-D2EA-43FC-96701E848A75}"/>
+              </a:ext>
+            </a:extLst>
+          </p:cNvPr>
+          <p:cNvPicPr>
+            <a:picLocks noChangeAspect="1"/>
+          </p:cNvPicPr>
+          <p:nvPr/>
+        </p:nvPicPr>
+        <p:blipFill>
+          <a:blip r:embed="rId3"/>
+          <a:stretch>
+            <a:fillRect/>
+          </a:stretch>
+        </p:blipFill>
+        <p:spPr>
+          <a:xfrm>
+            <a:off x="63500" y="611742"/>
+            <a:ext cx="1524000" cy="828675"/>
+          </a:xfrm>
+          <a:prstGeom prst="rect">
+            <a:avLst/>
+          </a:prstGeom>
+        </p:spPr>
+      </p:pic>
+      <p:pic>
+        <p:nvPicPr>
+          <p:cNvPr id="4" name="Picture 3">
+            <a:extLst>
+              <a:ext uri="{FF2B5EF4-FFF2-40B4-BE49-F238E27FC236}">
+                <a16:creationId xmlns:a16="http://schemas.microsoft.com/office/drawing/2014/main" id="{DAFDF9BD-14F0-E3BD-EDDA-718DD6D65B0D}"/>
+              </a:ext>
+            </a:extLst>
+          </p:cNvPr>
+          <p:cNvPicPr>
+            <a:picLocks noChangeAspect="1"/>
+          </p:cNvPicPr>
+          <p:nvPr/>
+        </p:nvPicPr>
+        <p:blipFill>
+          <a:blip r:embed="rId4"/>
+          <a:stretch>
+            <a:fillRect/>
+          </a:stretch>
+        </p:blipFill>
+        <p:spPr>
+          <a:xfrm>
+            <a:off x="63500" y="1503917"/>
+            <a:ext cx="2390775" cy="1533525"/>
+          </a:xfrm>
+          <a:prstGeom prst="rect">
+            <a:avLst/>
+          </a:prstGeom>
+        </p:spPr>
+      </p:pic>
+      <p:pic>
+        <p:nvPicPr>
+          <p:cNvPr id="5" name="Picture 4">
+            <a:extLst>
+              <a:ext uri="{FF2B5EF4-FFF2-40B4-BE49-F238E27FC236}">
+                <a16:creationId xmlns:a16="http://schemas.microsoft.com/office/drawing/2014/main" id="{32136DF7-30CA-51AA-AB05-2C9C6A5D6795}"/>
+              </a:ext>
+            </a:extLst>
+          </p:cNvPr>
+          <p:cNvPicPr>
+            <a:picLocks noChangeAspect="1"/>
+          </p:cNvPicPr>
+          <p:nvPr/>
+        </p:nvPicPr>
+        <p:blipFill>
+          <a:blip r:embed="rId5"/>
+          <a:stretch>
+            <a:fillRect/>
+          </a:stretch>
+        </p:blipFill>
+        <p:spPr>
+          <a:xfrm>
+            <a:off x="63500" y="3100942"/>
+            <a:ext cx="3409950" cy="2219325"/>
+          </a:xfrm>
+          <a:prstGeom prst="rect">
+            <a:avLst/>
+          </a:prstGeom>
+        </p:spPr>
+      </p:pic>
+      <p:pic>
+        <p:nvPicPr>
+          <p:cNvPr id="6" name="Picture 5">
+            <a:extLst>
+              <a:ext uri="{FF2B5EF4-FFF2-40B4-BE49-F238E27FC236}">
+                <a16:creationId xmlns:a16="http://schemas.microsoft.com/office/drawing/2014/main" id="{0CC49CEE-95ED-15C1-31A5-F9F3F8C0535B}"/>
+              </a:ext>
+            </a:extLst>
+          </p:cNvPr>
+          <p:cNvPicPr>
+            <a:picLocks noChangeAspect="1"/>
+          </p:cNvPicPr>
+          <p:nvPr/>
+        </p:nvPicPr>
+        <p:blipFill>
+          <a:blip r:embed="rId6"/>
+          <a:stretch>
+            <a:fillRect/>
+          </a:stretch>
+        </p:blipFill>
+        <p:spPr>
+          <a:xfrm>
+            <a:off x="63500" y="5383767"/>
+            <a:ext cx="2409825" cy="1019175"/>
+          </a:xfrm>
+          <a:prstGeom prst="rect">
+            <a:avLst/>
+          </a:prstGeom>
+        </p:spPr>
+      </p:pic>
+    </p:spTree>
+    <p:extLst>
+      <p:ext uri="{BB962C8B-B14F-4D97-AF65-F5344CB8AC3E}">
+        <p14:creationId xmlns:p14="http://schemas.microsoft.com/office/powerpoint/2010/main" val="2600380567"/>
+      </p:ext>
+    </p:extLst>
+  </p:cSld>
+  <p:clrMapOvr>
+    <a:masterClrMapping/>
+  </p:clrMapOvr>
+</p:sld>
+</file>
+
+<file path=ppt/slides/slide29.xml><?xml version="1.0" encoding="utf-8"?>
+<p:sld xmlns:a="http://schemas.openxmlformats.org/drawingml/2006/main" xmlns:r="http://schemas.openxmlformats.org/officeDocument/2006/relationships" xmlns:p="http://schemas.openxmlformats.org/presentationml/2006/main">
+  <p:cSld>
+    <p:spTree>
+      <p:nvGrpSpPr>
+        <p:cNvPr id="1" name=""/>
+        <p:cNvGrpSpPr/>
+        <p:nvPr/>
+      </p:nvGrpSpPr>
+      <p:grpSpPr>
+        <a:xfrm>
+          <a:off x="0" y="0"/>
+          <a:ext cx="0" cy="0"/>
+          <a:chOff x="0" y="0"/>
+          <a:chExt cx="0" cy="0"/>
+        </a:xfrm>
+      </p:grpSpPr>
+      <p:pic>
+        <p:nvPicPr>
+          <p:cNvPr id="2" name="Picture 1">
+            <a:extLst>
+              <a:ext uri="{FF2B5EF4-FFF2-40B4-BE49-F238E27FC236}">
+                <a16:creationId xmlns:a16="http://schemas.microsoft.com/office/drawing/2014/main" id="{ABE7BDCC-CAE0-3171-30F3-95420F775C9C}"/>
+              </a:ext>
+            </a:extLst>
+          </p:cNvPr>
+          <p:cNvPicPr>
+            <a:picLocks noChangeAspect="1"/>
+          </p:cNvPicPr>
+          <p:nvPr/>
+        </p:nvPicPr>
+        <p:blipFill>
+          <a:blip r:embed="rId2"/>
+          <a:stretch>
+            <a:fillRect/>
+          </a:stretch>
+        </p:blipFill>
+        <p:spPr>
+          <a:xfrm>
+            <a:off x="63500" y="63500"/>
+            <a:ext cx="3429000" cy="2733675"/>
+          </a:xfrm>
+          <a:prstGeom prst="rect">
+            <a:avLst/>
+          </a:prstGeom>
+        </p:spPr>
+      </p:pic>
+      <p:pic>
+        <p:nvPicPr>
+          <p:cNvPr id="3" name="Picture 2">
+            <a:extLst>
+              <a:ext uri="{FF2B5EF4-FFF2-40B4-BE49-F238E27FC236}">
+                <a16:creationId xmlns:a16="http://schemas.microsoft.com/office/drawing/2014/main" id="{90F06C24-D52E-F47C-028C-45F02AC6D44A}"/>
+              </a:ext>
+            </a:extLst>
+          </p:cNvPr>
+          <p:cNvPicPr>
+            <a:picLocks noChangeAspect="1"/>
+          </p:cNvPicPr>
+          <p:nvPr/>
+        </p:nvPicPr>
+        <p:blipFill>
+          <a:blip r:embed="rId3"/>
+          <a:stretch>
+            <a:fillRect/>
+          </a:stretch>
+        </p:blipFill>
+        <p:spPr>
+          <a:xfrm>
+            <a:off x="63500" y="2860675"/>
+            <a:ext cx="4676775" cy="1438275"/>
+          </a:xfrm>
+          <a:prstGeom prst="rect">
+            <a:avLst/>
+          </a:prstGeom>
+        </p:spPr>
+      </p:pic>
+      <p:pic>
+        <p:nvPicPr>
+          <p:cNvPr id="4" name="Picture 3">
+            <a:extLst>
+              <a:ext uri="{FF2B5EF4-FFF2-40B4-BE49-F238E27FC236}">
+                <a16:creationId xmlns:a16="http://schemas.microsoft.com/office/drawing/2014/main" id="{483FF4AF-A10D-6388-82B2-9408680BB9E0}"/>
+              </a:ext>
+            </a:extLst>
+          </p:cNvPr>
+          <p:cNvPicPr>
+            <a:picLocks noChangeAspect="1"/>
+          </p:cNvPicPr>
+          <p:nvPr/>
+        </p:nvPicPr>
+        <p:blipFill>
+          <a:blip r:embed="rId4"/>
+          <a:stretch>
+            <a:fillRect/>
+          </a:stretch>
+        </p:blipFill>
+        <p:spPr>
+          <a:xfrm>
+            <a:off x="63500" y="4362450"/>
+            <a:ext cx="3448050" cy="1781175"/>
+          </a:xfrm>
+          <a:prstGeom prst="rect">
+            <a:avLst/>
+          </a:prstGeom>
+        </p:spPr>
+      </p:pic>
+    </p:spTree>
+    <p:extLst>
+      <p:ext uri="{BB962C8B-B14F-4D97-AF65-F5344CB8AC3E}">
+        <p14:creationId xmlns:p14="http://schemas.microsoft.com/office/powerpoint/2010/main" val="2069576570"/>
+      </p:ext>
+    </p:extLst>
+  </p:cSld>
+  <p:clrMapOvr>
+    <a:masterClrMapping/>
+  </p:clrMapOvr>
+</p:sld>
+</file>
+
 <file path=ppt/slides/slide3.xml><?xml version="1.0" encoding="utf-8"?>
 <p:sld xmlns:a="http://schemas.openxmlformats.org/drawingml/2006/main" xmlns:r="http://schemas.openxmlformats.org/officeDocument/2006/relationships" xmlns:p="http://schemas.openxmlformats.org/presentationml/2006/main">
   <p:cSld>
@@ -12349,6 +12867,816 @@
     <p:extLst>
       <p:ext uri="{BB962C8B-B14F-4D97-AF65-F5344CB8AC3E}">
         <p14:creationId xmlns:p14="http://schemas.microsoft.com/office/powerpoint/2010/main" val="173674783"/>
+      </p:ext>
+    </p:extLst>
+  </p:cSld>
+  <p:clrMapOvr>
+    <a:masterClrMapping/>
+  </p:clrMapOvr>
+</p:sld>
+</file>
+
+<file path=ppt/slides/slide30.xml><?xml version="1.0" encoding="utf-8"?>
+<p:sld xmlns:a="http://schemas.openxmlformats.org/drawingml/2006/main" xmlns:r="http://schemas.openxmlformats.org/officeDocument/2006/relationships" xmlns:p="http://schemas.openxmlformats.org/presentationml/2006/main">
+  <p:cSld>
+    <p:spTree>
+      <p:nvGrpSpPr>
+        <p:cNvPr id="1" name=""/>
+        <p:cNvGrpSpPr/>
+        <p:nvPr/>
+      </p:nvGrpSpPr>
+      <p:grpSpPr>
+        <a:xfrm>
+          <a:off x="0" y="0"/>
+          <a:ext cx="0" cy="0"/>
+          <a:chOff x="0" y="0"/>
+          <a:chExt cx="0" cy="0"/>
+        </a:xfrm>
+      </p:grpSpPr>
+      <p:pic>
+        <p:nvPicPr>
+          <p:cNvPr id="2" name="Picture 1">
+            <a:extLst>
+              <a:ext uri="{FF2B5EF4-FFF2-40B4-BE49-F238E27FC236}">
+                <a16:creationId xmlns:a16="http://schemas.microsoft.com/office/drawing/2014/main" id="{103FB37B-7741-8EFF-343B-EF2D7D8E70FD}"/>
+              </a:ext>
+            </a:extLst>
+          </p:cNvPr>
+          <p:cNvPicPr>
+            <a:picLocks noChangeAspect="1"/>
+          </p:cNvPicPr>
+          <p:nvPr/>
+        </p:nvPicPr>
+        <p:blipFill>
+          <a:blip r:embed="rId2"/>
+          <a:stretch>
+            <a:fillRect/>
+          </a:stretch>
+        </p:blipFill>
+        <p:spPr>
+          <a:xfrm>
+            <a:off x="63500" y="63500"/>
+            <a:ext cx="12192000" cy="484742"/>
+          </a:xfrm>
+          <a:prstGeom prst="rect">
+            <a:avLst/>
+          </a:prstGeom>
+        </p:spPr>
+      </p:pic>
+    </p:spTree>
+    <p:extLst>
+      <p:ext uri="{BB962C8B-B14F-4D97-AF65-F5344CB8AC3E}">
+        <p14:creationId xmlns:p14="http://schemas.microsoft.com/office/powerpoint/2010/main" val="818366411"/>
+      </p:ext>
+    </p:extLst>
+  </p:cSld>
+  <p:clrMapOvr>
+    <a:masterClrMapping/>
+  </p:clrMapOvr>
+</p:sld>
+</file>
+
+<file path=ppt/slides/slide31.xml><?xml version="1.0" encoding="utf-8"?>
+<p:sld xmlns:a="http://schemas.openxmlformats.org/drawingml/2006/main" xmlns:r="http://schemas.openxmlformats.org/officeDocument/2006/relationships" xmlns:p="http://schemas.openxmlformats.org/presentationml/2006/main">
+  <p:cSld>
+    <p:spTree>
+      <p:nvGrpSpPr>
+        <p:cNvPr id="1" name=""/>
+        <p:cNvGrpSpPr/>
+        <p:nvPr/>
+      </p:nvGrpSpPr>
+      <p:grpSpPr>
+        <a:xfrm>
+          <a:off x="0" y="0"/>
+          <a:ext cx="0" cy="0"/>
+          <a:chOff x="0" y="0"/>
+          <a:chExt cx="0" cy="0"/>
+        </a:xfrm>
+      </p:grpSpPr>
+      <p:pic>
+        <p:nvPicPr>
+          <p:cNvPr id="2" name="Picture 1">
+            <a:extLst>
+              <a:ext uri="{FF2B5EF4-FFF2-40B4-BE49-F238E27FC236}">
+                <a16:creationId xmlns:a16="http://schemas.microsoft.com/office/drawing/2014/main" id="{F47425C8-8EFE-EBA8-3B7D-73E957A25DD5}"/>
+              </a:ext>
+            </a:extLst>
+          </p:cNvPr>
+          <p:cNvPicPr>
+            <a:picLocks noChangeAspect="1"/>
+          </p:cNvPicPr>
+          <p:nvPr/>
+        </p:nvPicPr>
+        <p:blipFill>
+          <a:blip r:embed="rId2"/>
+          <a:stretch>
+            <a:fillRect/>
+          </a:stretch>
+        </p:blipFill>
+        <p:spPr>
+          <a:xfrm>
+            <a:off x="63500" y="63500"/>
+            <a:ext cx="12079111" cy="6794500"/>
+          </a:xfrm>
+          <a:prstGeom prst="rect">
+            <a:avLst/>
+          </a:prstGeom>
+        </p:spPr>
+      </p:pic>
+    </p:spTree>
+    <p:extLst>
+      <p:ext uri="{BB962C8B-B14F-4D97-AF65-F5344CB8AC3E}">
+        <p14:creationId xmlns:p14="http://schemas.microsoft.com/office/powerpoint/2010/main" val="2463606262"/>
+      </p:ext>
+    </p:extLst>
+  </p:cSld>
+  <p:clrMapOvr>
+    <a:masterClrMapping/>
+  </p:clrMapOvr>
+</p:sld>
+</file>
+
+<file path=ppt/slides/slide32.xml><?xml version="1.0" encoding="utf-8"?>
+<p:sld xmlns:a="http://schemas.openxmlformats.org/drawingml/2006/main" xmlns:r="http://schemas.openxmlformats.org/officeDocument/2006/relationships" xmlns:p="http://schemas.openxmlformats.org/presentationml/2006/main">
+  <p:cSld>
+    <p:spTree>
+      <p:nvGrpSpPr>
+        <p:cNvPr id="1" name=""/>
+        <p:cNvGrpSpPr/>
+        <p:nvPr/>
+      </p:nvGrpSpPr>
+      <p:grpSpPr>
+        <a:xfrm>
+          <a:off x="0" y="0"/>
+          <a:ext cx="0" cy="0"/>
+          <a:chOff x="0" y="0"/>
+          <a:chExt cx="0" cy="0"/>
+        </a:xfrm>
+      </p:grpSpPr>
+      <p:pic>
+        <p:nvPicPr>
+          <p:cNvPr id="2" name="Picture 1">
+            <a:extLst>
+              <a:ext uri="{FF2B5EF4-FFF2-40B4-BE49-F238E27FC236}">
+                <a16:creationId xmlns:a16="http://schemas.microsoft.com/office/drawing/2014/main" id="{4C6E8858-CAF3-6A2B-9927-BBEEBE169FBB}"/>
+              </a:ext>
+            </a:extLst>
+          </p:cNvPr>
+          <p:cNvPicPr>
+            <a:picLocks noChangeAspect="1"/>
+          </p:cNvPicPr>
+          <p:nvPr/>
+        </p:nvPicPr>
+        <p:blipFill>
+          <a:blip r:embed="rId2"/>
+          <a:stretch>
+            <a:fillRect/>
+          </a:stretch>
+        </p:blipFill>
+        <p:spPr>
+          <a:xfrm>
+            <a:off x="63500" y="63500"/>
+            <a:ext cx="12192000" cy="484742"/>
+          </a:xfrm>
+          <a:prstGeom prst="rect">
+            <a:avLst/>
+          </a:prstGeom>
+        </p:spPr>
+      </p:pic>
+    </p:spTree>
+    <p:extLst>
+      <p:ext uri="{BB962C8B-B14F-4D97-AF65-F5344CB8AC3E}">
+        <p14:creationId xmlns:p14="http://schemas.microsoft.com/office/powerpoint/2010/main" val="852935045"/>
+      </p:ext>
+    </p:extLst>
+  </p:cSld>
+  <p:clrMapOvr>
+    <a:masterClrMapping/>
+  </p:clrMapOvr>
+</p:sld>
+</file>
+
+<file path=ppt/slides/slide33.xml><?xml version="1.0" encoding="utf-8"?>
+<p:sld xmlns:a="http://schemas.openxmlformats.org/drawingml/2006/main" xmlns:r="http://schemas.openxmlformats.org/officeDocument/2006/relationships" xmlns:p="http://schemas.openxmlformats.org/presentationml/2006/main">
+  <p:cSld>
+    <p:spTree>
+      <p:nvGrpSpPr>
+        <p:cNvPr id="1" name=""/>
+        <p:cNvGrpSpPr/>
+        <p:nvPr/>
+      </p:nvGrpSpPr>
+      <p:grpSpPr>
+        <a:xfrm>
+          <a:off x="0" y="0"/>
+          <a:ext cx="0" cy="0"/>
+          <a:chOff x="0" y="0"/>
+          <a:chExt cx="0" cy="0"/>
+        </a:xfrm>
+      </p:grpSpPr>
+      <p:pic>
+        <p:nvPicPr>
+          <p:cNvPr id="2" name="Picture 1">
+            <a:extLst>
+              <a:ext uri="{FF2B5EF4-FFF2-40B4-BE49-F238E27FC236}">
+                <a16:creationId xmlns:a16="http://schemas.microsoft.com/office/drawing/2014/main" id="{2E58E642-23B9-F63A-0CE2-133DF3E4196D}"/>
+              </a:ext>
+            </a:extLst>
+          </p:cNvPr>
+          <p:cNvPicPr>
+            <a:picLocks noChangeAspect="1"/>
+          </p:cNvPicPr>
+          <p:nvPr/>
+        </p:nvPicPr>
+        <p:blipFill>
+          <a:blip r:embed="rId2"/>
+          <a:stretch>
+            <a:fillRect/>
+          </a:stretch>
+        </p:blipFill>
+        <p:spPr>
+          <a:xfrm>
+            <a:off x="63500" y="63500"/>
+            <a:ext cx="12079111" cy="6794500"/>
+          </a:xfrm>
+          <a:prstGeom prst="rect">
+            <a:avLst/>
+          </a:prstGeom>
+        </p:spPr>
+      </p:pic>
+    </p:spTree>
+    <p:extLst>
+      <p:ext uri="{BB962C8B-B14F-4D97-AF65-F5344CB8AC3E}">
+        <p14:creationId xmlns:p14="http://schemas.microsoft.com/office/powerpoint/2010/main" val="3049198341"/>
+      </p:ext>
+    </p:extLst>
+  </p:cSld>
+  <p:clrMapOvr>
+    <a:masterClrMapping/>
+  </p:clrMapOvr>
+</p:sld>
+</file>
+
+<file path=ppt/slides/slide34.xml><?xml version="1.0" encoding="utf-8"?>
+<p:sld xmlns:a="http://schemas.openxmlformats.org/drawingml/2006/main" xmlns:r="http://schemas.openxmlformats.org/officeDocument/2006/relationships" xmlns:p="http://schemas.openxmlformats.org/presentationml/2006/main">
+  <p:cSld>
+    <p:spTree>
+      <p:nvGrpSpPr>
+        <p:cNvPr id="1" name=""/>
+        <p:cNvGrpSpPr/>
+        <p:nvPr/>
+      </p:nvGrpSpPr>
+      <p:grpSpPr>
+        <a:xfrm>
+          <a:off x="0" y="0"/>
+          <a:ext cx="0" cy="0"/>
+          <a:chOff x="0" y="0"/>
+          <a:chExt cx="0" cy="0"/>
+        </a:xfrm>
+      </p:grpSpPr>
+      <p:pic>
+        <p:nvPicPr>
+          <p:cNvPr id="2" name="Picture 1">
+            <a:extLst>
+              <a:ext uri="{FF2B5EF4-FFF2-40B4-BE49-F238E27FC236}">
+                <a16:creationId xmlns:a16="http://schemas.microsoft.com/office/drawing/2014/main" id="{FC6BBE02-DD98-912C-F7BE-E3093DCA23DF}"/>
+              </a:ext>
+            </a:extLst>
+          </p:cNvPr>
+          <p:cNvPicPr>
+            <a:picLocks noChangeAspect="1"/>
+          </p:cNvPicPr>
+          <p:nvPr/>
+        </p:nvPicPr>
+        <p:blipFill>
+          <a:blip r:embed="rId2"/>
+          <a:stretch>
+            <a:fillRect/>
+          </a:stretch>
+        </p:blipFill>
+        <p:spPr>
+          <a:xfrm>
+            <a:off x="63500" y="63500"/>
+            <a:ext cx="12192000" cy="484742"/>
+          </a:xfrm>
+          <a:prstGeom prst="rect">
+            <a:avLst/>
+          </a:prstGeom>
+        </p:spPr>
+      </p:pic>
+      <p:pic>
+        <p:nvPicPr>
+          <p:cNvPr id="3" name="Picture 2">
+            <a:extLst>
+              <a:ext uri="{FF2B5EF4-FFF2-40B4-BE49-F238E27FC236}">
+                <a16:creationId xmlns:a16="http://schemas.microsoft.com/office/drawing/2014/main" id="{3F2B936D-EBAB-046C-26BA-11D0EB87E97C}"/>
+              </a:ext>
+            </a:extLst>
+          </p:cNvPr>
+          <p:cNvPicPr>
+            <a:picLocks noChangeAspect="1"/>
+          </p:cNvPicPr>
+          <p:nvPr/>
+        </p:nvPicPr>
+        <p:blipFill>
+          <a:blip r:embed="rId3"/>
+          <a:stretch>
+            <a:fillRect/>
+          </a:stretch>
+        </p:blipFill>
+        <p:spPr>
+          <a:xfrm>
+            <a:off x="63500" y="611742"/>
+            <a:ext cx="5019675" cy="3514725"/>
+          </a:xfrm>
+          <a:prstGeom prst="rect">
+            <a:avLst/>
+          </a:prstGeom>
+        </p:spPr>
+      </p:pic>
+    </p:spTree>
+    <p:extLst>
+      <p:ext uri="{BB962C8B-B14F-4D97-AF65-F5344CB8AC3E}">
+        <p14:creationId xmlns:p14="http://schemas.microsoft.com/office/powerpoint/2010/main" val="906481704"/>
+      </p:ext>
+    </p:extLst>
+  </p:cSld>
+  <p:clrMapOvr>
+    <a:masterClrMapping/>
+  </p:clrMapOvr>
+</p:sld>
+</file>
+
+<file path=ppt/slides/slide35.xml><?xml version="1.0" encoding="utf-8"?>
+<p:sld xmlns:a="http://schemas.openxmlformats.org/drawingml/2006/main" xmlns:r="http://schemas.openxmlformats.org/officeDocument/2006/relationships" xmlns:p="http://schemas.openxmlformats.org/presentationml/2006/main">
+  <p:cSld>
+    <p:spTree>
+      <p:nvGrpSpPr>
+        <p:cNvPr id="1" name=""/>
+        <p:cNvGrpSpPr/>
+        <p:nvPr/>
+      </p:nvGrpSpPr>
+      <p:grpSpPr>
+        <a:xfrm>
+          <a:off x="0" y="0"/>
+          <a:ext cx="0" cy="0"/>
+          <a:chOff x="0" y="0"/>
+          <a:chExt cx="0" cy="0"/>
+        </a:xfrm>
+      </p:grpSpPr>
+      <p:pic>
+        <p:nvPicPr>
+          <p:cNvPr id="2" name="Picture 1">
+            <a:extLst>
+              <a:ext uri="{FF2B5EF4-FFF2-40B4-BE49-F238E27FC236}">
+                <a16:creationId xmlns:a16="http://schemas.microsoft.com/office/drawing/2014/main" id="{095710C4-D0D2-3FB2-1ECC-09694AC55E38}"/>
+              </a:ext>
+            </a:extLst>
+          </p:cNvPr>
+          <p:cNvPicPr>
+            <a:picLocks noChangeAspect="1"/>
+          </p:cNvPicPr>
+          <p:nvPr/>
+        </p:nvPicPr>
+        <p:blipFill>
+          <a:blip r:embed="rId2"/>
+          <a:stretch>
+            <a:fillRect/>
+          </a:stretch>
+        </p:blipFill>
+        <p:spPr>
+          <a:xfrm>
+            <a:off x="63500" y="63500"/>
+            <a:ext cx="12192000" cy="484742"/>
+          </a:xfrm>
+          <a:prstGeom prst="rect">
+            <a:avLst/>
+          </a:prstGeom>
+        </p:spPr>
+      </p:pic>
+      <p:pic>
+        <p:nvPicPr>
+          <p:cNvPr id="3" name="Picture 2">
+            <a:extLst>
+              <a:ext uri="{FF2B5EF4-FFF2-40B4-BE49-F238E27FC236}">
+                <a16:creationId xmlns:a16="http://schemas.microsoft.com/office/drawing/2014/main" id="{35113CCE-86CA-1A5D-D7BC-5173B88EA5A3}"/>
+              </a:ext>
+            </a:extLst>
+          </p:cNvPr>
+          <p:cNvPicPr>
+            <a:picLocks noChangeAspect="1"/>
+          </p:cNvPicPr>
+          <p:nvPr/>
+        </p:nvPicPr>
+        <p:blipFill>
+          <a:blip r:embed="rId3"/>
+          <a:stretch>
+            <a:fillRect/>
+          </a:stretch>
+        </p:blipFill>
+        <p:spPr>
+          <a:xfrm>
+            <a:off x="63500" y="611742"/>
+            <a:ext cx="1524000" cy="828675"/>
+          </a:xfrm>
+          <a:prstGeom prst="rect">
+            <a:avLst/>
+          </a:prstGeom>
+        </p:spPr>
+      </p:pic>
+      <p:pic>
+        <p:nvPicPr>
+          <p:cNvPr id="4" name="Picture 3">
+            <a:extLst>
+              <a:ext uri="{FF2B5EF4-FFF2-40B4-BE49-F238E27FC236}">
+                <a16:creationId xmlns:a16="http://schemas.microsoft.com/office/drawing/2014/main" id="{1354CA73-0CE7-FBAD-5CC1-17032FC77596}"/>
+              </a:ext>
+            </a:extLst>
+          </p:cNvPr>
+          <p:cNvPicPr>
+            <a:picLocks noChangeAspect="1"/>
+          </p:cNvPicPr>
+          <p:nvPr/>
+        </p:nvPicPr>
+        <p:blipFill>
+          <a:blip r:embed="rId4"/>
+          <a:stretch>
+            <a:fillRect/>
+          </a:stretch>
+        </p:blipFill>
+        <p:spPr>
+          <a:xfrm>
+            <a:off x="63500" y="1503917"/>
+            <a:ext cx="2390775" cy="1533525"/>
+          </a:xfrm>
+          <a:prstGeom prst="rect">
+            <a:avLst/>
+          </a:prstGeom>
+        </p:spPr>
+      </p:pic>
+      <p:pic>
+        <p:nvPicPr>
+          <p:cNvPr id="5" name="Picture 4">
+            <a:extLst>
+              <a:ext uri="{FF2B5EF4-FFF2-40B4-BE49-F238E27FC236}">
+                <a16:creationId xmlns:a16="http://schemas.microsoft.com/office/drawing/2014/main" id="{E0A15510-1052-7B92-972C-58F796E5C787}"/>
+              </a:ext>
+            </a:extLst>
+          </p:cNvPr>
+          <p:cNvPicPr>
+            <a:picLocks noChangeAspect="1"/>
+          </p:cNvPicPr>
+          <p:nvPr/>
+        </p:nvPicPr>
+        <p:blipFill>
+          <a:blip r:embed="rId5"/>
+          <a:stretch>
+            <a:fillRect/>
+          </a:stretch>
+        </p:blipFill>
+        <p:spPr>
+          <a:xfrm>
+            <a:off x="63500" y="3100942"/>
+            <a:ext cx="3409950" cy="2219325"/>
+          </a:xfrm>
+          <a:prstGeom prst="rect">
+            <a:avLst/>
+          </a:prstGeom>
+        </p:spPr>
+      </p:pic>
+      <p:pic>
+        <p:nvPicPr>
+          <p:cNvPr id="6" name="Picture 5">
+            <a:extLst>
+              <a:ext uri="{FF2B5EF4-FFF2-40B4-BE49-F238E27FC236}">
+                <a16:creationId xmlns:a16="http://schemas.microsoft.com/office/drawing/2014/main" id="{0560BB6C-F105-5BAD-EE18-ACFC721C310B}"/>
+              </a:ext>
+            </a:extLst>
+          </p:cNvPr>
+          <p:cNvPicPr>
+            <a:picLocks noChangeAspect="1"/>
+          </p:cNvPicPr>
+          <p:nvPr/>
+        </p:nvPicPr>
+        <p:blipFill>
+          <a:blip r:embed="rId6"/>
+          <a:stretch>
+            <a:fillRect/>
+          </a:stretch>
+        </p:blipFill>
+        <p:spPr>
+          <a:xfrm>
+            <a:off x="63500" y="5383767"/>
+            <a:ext cx="2409825" cy="1019175"/>
+          </a:xfrm>
+          <a:prstGeom prst="rect">
+            <a:avLst/>
+          </a:prstGeom>
+        </p:spPr>
+      </p:pic>
+    </p:spTree>
+    <p:extLst>
+      <p:ext uri="{BB962C8B-B14F-4D97-AF65-F5344CB8AC3E}">
+        <p14:creationId xmlns:p14="http://schemas.microsoft.com/office/powerpoint/2010/main" val="1160086611"/>
+      </p:ext>
+    </p:extLst>
+  </p:cSld>
+  <p:clrMapOvr>
+    <a:masterClrMapping/>
+  </p:clrMapOvr>
+</p:sld>
+</file>
+
+<file path=ppt/slides/slide36.xml><?xml version="1.0" encoding="utf-8"?>
+<p:sld xmlns:a="http://schemas.openxmlformats.org/drawingml/2006/main" xmlns:r="http://schemas.openxmlformats.org/officeDocument/2006/relationships" xmlns:p="http://schemas.openxmlformats.org/presentationml/2006/main">
+  <p:cSld>
+    <p:spTree>
+      <p:nvGrpSpPr>
+        <p:cNvPr id="1" name=""/>
+        <p:cNvGrpSpPr/>
+        <p:nvPr/>
+      </p:nvGrpSpPr>
+      <p:grpSpPr>
+        <a:xfrm>
+          <a:off x="0" y="0"/>
+          <a:ext cx="0" cy="0"/>
+          <a:chOff x="0" y="0"/>
+          <a:chExt cx="0" cy="0"/>
+        </a:xfrm>
+      </p:grpSpPr>
+      <p:pic>
+        <p:nvPicPr>
+          <p:cNvPr id="2" name="Picture 1">
+            <a:extLst>
+              <a:ext uri="{FF2B5EF4-FFF2-40B4-BE49-F238E27FC236}">
+                <a16:creationId xmlns:a16="http://schemas.microsoft.com/office/drawing/2014/main" id="{EDD8AFFF-EC8E-9DFF-62BB-68019D7EC6D0}"/>
+              </a:ext>
+            </a:extLst>
+          </p:cNvPr>
+          <p:cNvPicPr>
+            <a:picLocks noChangeAspect="1"/>
+          </p:cNvPicPr>
+          <p:nvPr/>
+        </p:nvPicPr>
+        <p:blipFill>
+          <a:blip r:embed="rId2"/>
+          <a:stretch>
+            <a:fillRect/>
+          </a:stretch>
+        </p:blipFill>
+        <p:spPr>
+          <a:xfrm>
+            <a:off x="63500" y="63500"/>
+            <a:ext cx="3429000" cy="3076575"/>
+          </a:xfrm>
+          <a:prstGeom prst="rect">
+            <a:avLst/>
+          </a:prstGeom>
+        </p:spPr>
+      </p:pic>
+      <p:pic>
+        <p:nvPicPr>
+          <p:cNvPr id="3" name="Picture 2">
+            <a:extLst>
+              <a:ext uri="{FF2B5EF4-FFF2-40B4-BE49-F238E27FC236}">
+                <a16:creationId xmlns:a16="http://schemas.microsoft.com/office/drawing/2014/main" id="{D38A89B1-F7CC-8766-8348-50A3D7355437}"/>
+              </a:ext>
+            </a:extLst>
+          </p:cNvPr>
+          <p:cNvPicPr>
+            <a:picLocks noChangeAspect="1"/>
+          </p:cNvPicPr>
+          <p:nvPr/>
+        </p:nvPicPr>
+        <p:blipFill>
+          <a:blip r:embed="rId3"/>
+          <a:stretch>
+            <a:fillRect/>
+          </a:stretch>
+        </p:blipFill>
+        <p:spPr>
+          <a:xfrm>
+            <a:off x="63500" y="3203575"/>
+            <a:ext cx="4829175" cy="1590675"/>
+          </a:xfrm>
+          <a:prstGeom prst="rect">
+            <a:avLst/>
+          </a:prstGeom>
+        </p:spPr>
+      </p:pic>
+      <p:pic>
+        <p:nvPicPr>
+          <p:cNvPr id="4" name="Picture 3">
+            <a:extLst>
+              <a:ext uri="{FF2B5EF4-FFF2-40B4-BE49-F238E27FC236}">
+                <a16:creationId xmlns:a16="http://schemas.microsoft.com/office/drawing/2014/main" id="{987CDA43-BB89-4DD3-9348-5FD93E90AC2A}"/>
+              </a:ext>
+            </a:extLst>
+          </p:cNvPr>
+          <p:cNvPicPr>
+            <a:picLocks noChangeAspect="1"/>
+          </p:cNvPicPr>
+          <p:nvPr/>
+        </p:nvPicPr>
+        <p:blipFill>
+          <a:blip r:embed="rId4"/>
+          <a:stretch>
+            <a:fillRect/>
+          </a:stretch>
+        </p:blipFill>
+        <p:spPr>
+          <a:xfrm>
+            <a:off x="63500" y="4857750"/>
+            <a:ext cx="3448050" cy="1609725"/>
+          </a:xfrm>
+          <a:prstGeom prst="rect">
+            <a:avLst/>
+          </a:prstGeom>
+        </p:spPr>
+      </p:pic>
+    </p:spTree>
+    <p:extLst>
+      <p:ext uri="{BB962C8B-B14F-4D97-AF65-F5344CB8AC3E}">
+        <p14:creationId xmlns:p14="http://schemas.microsoft.com/office/powerpoint/2010/main" val="717712197"/>
+      </p:ext>
+    </p:extLst>
+  </p:cSld>
+  <p:clrMapOvr>
+    <a:masterClrMapping/>
+  </p:clrMapOvr>
+</p:sld>
+</file>
+
+<file path=ppt/slides/slide37.xml><?xml version="1.0" encoding="utf-8"?>
+<p:sld xmlns:a="http://schemas.openxmlformats.org/drawingml/2006/main" xmlns:r="http://schemas.openxmlformats.org/officeDocument/2006/relationships" xmlns:p="http://schemas.openxmlformats.org/presentationml/2006/main">
+  <p:cSld>
+    <p:spTree>
+      <p:nvGrpSpPr>
+        <p:cNvPr id="1" name=""/>
+        <p:cNvGrpSpPr/>
+        <p:nvPr/>
+      </p:nvGrpSpPr>
+      <p:grpSpPr>
+        <a:xfrm>
+          <a:off x="0" y="0"/>
+          <a:ext cx="0" cy="0"/>
+          <a:chOff x="0" y="0"/>
+          <a:chExt cx="0" cy="0"/>
+        </a:xfrm>
+      </p:grpSpPr>
+      <p:pic>
+        <p:nvPicPr>
+          <p:cNvPr id="2" name="Picture 1">
+            <a:extLst>
+              <a:ext uri="{FF2B5EF4-FFF2-40B4-BE49-F238E27FC236}">
+                <a16:creationId xmlns:a16="http://schemas.microsoft.com/office/drawing/2014/main" id="{4118F305-A32D-1FEC-D80F-B320E47F69F0}"/>
+              </a:ext>
+            </a:extLst>
+          </p:cNvPr>
+          <p:cNvPicPr>
+            <a:picLocks noChangeAspect="1"/>
+          </p:cNvPicPr>
+          <p:nvPr/>
+        </p:nvPicPr>
+        <p:blipFill>
+          <a:blip r:embed="rId2"/>
+          <a:stretch>
+            <a:fillRect/>
+          </a:stretch>
+        </p:blipFill>
+        <p:spPr>
+          <a:xfrm>
+            <a:off x="63500" y="63500"/>
+            <a:ext cx="12192000" cy="484742"/>
+          </a:xfrm>
+          <a:prstGeom prst="rect">
+            <a:avLst/>
+          </a:prstGeom>
+        </p:spPr>
+      </p:pic>
+    </p:spTree>
+    <p:extLst>
+      <p:ext uri="{BB962C8B-B14F-4D97-AF65-F5344CB8AC3E}">
+        <p14:creationId xmlns:p14="http://schemas.microsoft.com/office/powerpoint/2010/main" val="2344658804"/>
+      </p:ext>
+    </p:extLst>
+  </p:cSld>
+  <p:clrMapOvr>
+    <a:masterClrMapping/>
+  </p:clrMapOvr>
+</p:sld>
+</file>
+
+<file path=ppt/slides/slide38.xml><?xml version="1.0" encoding="utf-8"?>
+<p:sld xmlns:a="http://schemas.openxmlformats.org/drawingml/2006/main" xmlns:r="http://schemas.openxmlformats.org/officeDocument/2006/relationships" xmlns:p="http://schemas.openxmlformats.org/presentationml/2006/main">
+  <p:cSld>
+    <p:spTree>
+      <p:nvGrpSpPr>
+        <p:cNvPr id="1" name=""/>
+        <p:cNvGrpSpPr/>
+        <p:nvPr/>
+      </p:nvGrpSpPr>
+      <p:grpSpPr>
+        <a:xfrm>
+          <a:off x="0" y="0"/>
+          <a:ext cx="0" cy="0"/>
+          <a:chOff x="0" y="0"/>
+          <a:chExt cx="0" cy="0"/>
+        </a:xfrm>
+      </p:grpSpPr>
+      <p:pic>
+        <p:nvPicPr>
+          <p:cNvPr id="2" name="Picture 1">
+            <a:extLst>
+              <a:ext uri="{FF2B5EF4-FFF2-40B4-BE49-F238E27FC236}">
+                <a16:creationId xmlns:a16="http://schemas.microsoft.com/office/drawing/2014/main" id="{66A98B04-DC03-3CFE-9CAF-4802C45934D5}"/>
+              </a:ext>
+            </a:extLst>
+          </p:cNvPr>
+          <p:cNvPicPr>
+            <a:picLocks noChangeAspect="1"/>
+          </p:cNvPicPr>
+          <p:nvPr/>
+        </p:nvPicPr>
+        <p:blipFill>
+          <a:blip r:embed="rId2"/>
+          <a:stretch>
+            <a:fillRect/>
+          </a:stretch>
+        </p:blipFill>
+        <p:spPr>
+          <a:xfrm>
+            <a:off x="63500" y="63500"/>
+            <a:ext cx="12079111" cy="6794500"/>
+          </a:xfrm>
+          <a:prstGeom prst="rect">
+            <a:avLst/>
+          </a:prstGeom>
+        </p:spPr>
+      </p:pic>
+    </p:spTree>
+    <p:extLst>
+      <p:ext uri="{BB962C8B-B14F-4D97-AF65-F5344CB8AC3E}">
+        <p14:creationId xmlns:p14="http://schemas.microsoft.com/office/powerpoint/2010/main" val="3934532912"/>
+      </p:ext>
+    </p:extLst>
+  </p:cSld>
+  <p:clrMapOvr>
+    <a:masterClrMapping/>
+  </p:clrMapOvr>
+</p:sld>
+</file>
+
+<file path=ppt/slides/slide39.xml><?xml version="1.0" encoding="utf-8"?>
+<p:sld xmlns:a="http://schemas.openxmlformats.org/drawingml/2006/main" xmlns:r="http://schemas.openxmlformats.org/officeDocument/2006/relationships" xmlns:p="http://schemas.openxmlformats.org/presentationml/2006/main">
+  <p:cSld>
+    <p:spTree>
+      <p:nvGrpSpPr>
+        <p:cNvPr id="1" name=""/>
+        <p:cNvGrpSpPr/>
+        <p:nvPr/>
+      </p:nvGrpSpPr>
+      <p:grpSpPr>
+        <a:xfrm>
+          <a:off x="0" y="0"/>
+          <a:ext cx="0" cy="0"/>
+          <a:chOff x="0" y="0"/>
+          <a:chExt cx="0" cy="0"/>
+        </a:xfrm>
+      </p:grpSpPr>
+      <p:pic>
+        <p:nvPicPr>
+          <p:cNvPr id="2" name="Picture 1">
+            <a:extLst>
+              <a:ext uri="{FF2B5EF4-FFF2-40B4-BE49-F238E27FC236}">
+                <a16:creationId xmlns:a16="http://schemas.microsoft.com/office/drawing/2014/main" id="{8CA11BAD-A6B7-0276-6661-1070C8324BC3}"/>
+              </a:ext>
+            </a:extLst>
+          </p:cNvPr>
+          <p:cNvPicPr>
+            <a:picLocks noChangeAspect="1"/>
+          </p:cNvPicPr>
+          <p:nvPr/>
+        </p:nvPicPr>
+        <p:blipFill>
+          <a:blip r:embed="rId2"/>
+          <a:stretch>
+            <a:fillRect/>
+          </a:stretch>
+        </p:blipFill>
+        <p:spPr>
+          <a:xfrm>
+            <a:off x="63500" y="63500"/>
+            <a:ext cx="12192000" cy="484742"/>
+          </a:xfrm>
+          <a:prstGeom prst="rect">
+            <a:avLst/>
+          </a:prstGeom>
+        </p:spPr>
+      </p:pic>
+    </p:spTree>
+    <p:extLst>
+      <p:ext uri="{BB962C8B-B14F-4D97-AF65-F5344CB8AC3E}">
+        <p14:creationId xmlns:p14="http://schemas.microsoft.com/office/powerpoint/2010/main" val="3000992346"/>
       </p:ext>
     </p:extLst>
   </p:cSld>
@@ -12409,6 +13737,726 @@
     <p:extLst>
       <p:ext uri="{BB962C8B-B14F-4D97-AF65-F5344CB8AC3E}">
         <p14:creationId xmlns:p14="http://schemas.microsoft.com/office/powerpoint/2010/main" val="161046226"/>
+      </p:ext>
+    </p:extLst>
+  </p:cSld>
+  <p:clrMapOvr>
+    <a:masterClrMapping/>
+  </p:clrMapOvr>
+</p:sld>
+</file>
+
+<file path=ppt/slides/slide40.xml><?xml version="1.0" encoding="utf-8"?>
+<p:sld xmlns:a="http://schemas.openxmlformats.org/drawingml/2006/main" xmlns:r="http://schemas.openxmlformats.org/officeDocument/2006/relationships" xmlns:p="http://schemas.openxmlformats.org/presentationml/2006/main">
+  <p:cSld>
+    <p:spTree>
+      <p:nvGrpSpPr>
+        <p:cNvPr id="1" name=""/>
+        <p:cNvGrpSpPr/>
+        <p:nvPr/>
+      </p:nvGrpSpPr>
+      <p:grpSpPr>
+        <a:xfrm>
+          <a:off x="0" y="0"/>
+          <a:ext cx="0" cy="0"/>
+          <a:chOff x="0" y="0"/>
+          <a:chExt cx="0" cy="0"/>
+        </a:xfrm>
+      </p:grpSpPr>
+      <p:pic>
+        <p:nvPicPr>
+          <p:cNvPr id="2" name="Picture 1">
+            <a:extLst>
+              <a:ext uri="{FF2B5EF4-FFF2-40B4-BE49-F238E27FC236}">
+                <a16:creationId xmlns:a16="http://schemas.microsoft.com/office/drawing/2014/main" id="{41C89358-9683-0326-FDFA-632FEDA81B95}"/>
+              </a:ext>
+            </a:extLst>
+          </p:cNvPr>
+          <p:cNvPicPr>
+            <a:picLocks noChangeAspect="1"/>
+          </p:cNvPicPr>
+          <p:nvPr/>
+        </p:nvPicPr>
+        <p:blipFill>
+          <a:blip r:embed="rId2"/>
+          <a:stretch>
+            <a:fillRect/>
+          </a:stretch>
+        </p:blipFill>
+        <p:spPr>
+          <a:xfrm>
+            <a:off x="63500" y="63500"/>
+            <a:ext cx="12079111" cy="6794500"/>
+          </a:xfrm>
+          <a:prstGeom prst="rect">
+            <a:avLst/>
+          </a:prstGeom>
+        </p:spPr>
+      </p:pic>
+    </p:spTree>
+    <p:extLst>
+      <p:ext uri="{BB962C8B-B14F-4D97-AF65-F5344CB8AC3E}">
+        <p14:creationId xmlns:p14="http://schemas.microsoft.com/office/powerpoint/2010/main" val="4020903698"/>
+      </p:ext>
+    </p:extLst>
+  </p:cSld>
+  <p:clrMapOvr>
+    <a:masterClrMapping/>
+  </p:clrMapOvr>
+</p:sld>
+</file>
+
+<file path=ppt/slides/slide41.xml><?xml version="1.0" encoding="utf-8"?>
+<p:sld xmlns:a="http://schemas.openxmlformats.org/drawingml/2006/main" xmlns:r="http://schemas.openxmlformats.org/officeDocument/2006/relationships" xmlns:p="http://schemas.openxmlformats.org/presentationml/2006/main">
+  <p:cSld>
+    <p:spTree>
+      <p:nvGrpSpPr>
+        <p:cNvPr id="1" name=""/>
+        <p:cNvGrpSpPr/>
+        <p:nvPr/>
+      </p:nvGrpSpPr>
+      <p:grpSpPr>
+        <a:xfrm>
+          <a:off x="0" y="0"/>
+          <a:ext cx="0" cy="0"/>
+          <a:chOff x="0" y="0"/>
+          <a:chExt cx="0" cy="0"/>
+        </a:xfrm>
+      </p:grpSpPr>
+      <p:pic>
+        <p:nvPicPr>
+          <p:cNvPr id="2" name="Picture 1">
+            <a:extLst>
+              <a:ext uri="{FF2B5EF4-FFF2-40B4-BE49-F238E27FC236}">
+                <a16:creationId xmlns:a16="http://schemas.microsoft.com/office/drawing/2014/main" id="{21CA1FFE-663B-C76D-ECB1-8C990A84B216}"/>
+              </a:ext>
+            </a:extLst>
+          </p:cNvPr>
+          <p:cNvPicPr>
+            <a:picLocks noChangeAspect="1"/>
+          </p:cNvPicPr>
+          <p:nvPr/>
+        </p:nvPicPr>
+        <p:blipFill>
+          <a:blip r:embed="rId2"/>
+          <a:stretch>
+            <a:fillRect/>
+          </a:stretch>
+        </p:blipFill>
+        <p:spPr>
+          <a:xfrm>
+            <a:off x="63500" y="63500"/>
+            <a:ext cx="12192000" cy="484742"/>
+          </a:xfrm>
+          <a:prstGeom prst="rect">
+            <a:avLst/>
+          </a:prstGeom>
+        </p:spPr>
+      </p:pic>
+      <p:pic>
+        <p:nvPicPr>
+          <p:cNvPr id="3" name="Picture 2">
+            <a:extLst>
+              <a:ext uri="{FF2B5EF4-FFF2-40B4-BE49-F238E27FC236}">
+                <a16:creationId xmlns:a16="http://schemas.microsoft.com/office/drawing/2014/main" id="{2F9CAE54-402D-DB83-7963-7C42A295E690}"/>
+              </a:ext>
+            </a:extLst>
+          </p:cNvPr>
+          <p:cNvPicPr>
+            <a:picLocks noChangeAspect="1"/>
+          </p:cNvPicPr>
+          <p:nvPr/>
+        </p:nvPicPr>
+        <p:blipFill>
+          <a:blip r:embed="rId3"/>
+          <a:stretch>
+            <a:fillRect/>
+          </a:stretch>
+        </p:blipFill>
+        <p:spPr>
+          <a:xfrm>
+            <a:off x="63500" y="611742"/>
+            <a:ext cx="4838700" cy="3171825"/>
+          </a:xfrm>
+          <a:prstGeom prst="rect">
+            <a:avLst/>
+          </a:prstGeom>
+        </p:spPr>
+      </p:pic>
+    </p:spTree>
+    <p:extLst>
+      <p:ext uri="{BB962C8B-B14F-4D97-AF65-F5344CB8AC3E}">
+        <p14:creationId xmlns:p14="http://schemas.microsoft.com/office/powerpoint/2010/main" val="2057585345"/>
+      </p:ext>
+    </p:extLst>
+  </p:cSld>
+  <p:clrMapOvr>
+    <a:masterClrMapping/>
+  </p:clrMapOvr>
+</p:sld>
+</file>
+
+<file path=ppt/slides/slide42.xml><?xml version="1.0" encoding="utf-8"?>
+<p:sld xmlns:a="http://schemas.openxmlformats.org/drawingml/2006/main" xmlns:r="http://schemas.openxmlformats.org/officeDocument/2006/relationships" xmlns:p="http://schemas.openxmlformats.org/presentationml/2006/main">
+  <p:cSld>
+    <p:spTree>
+      <p:nvGrpSpPr>
+        <p:cNvPr id="1" name=""/>
+        <p:cNvGrpSpPr/>
+        <p:nvPr/>
+      </p:nvGrpSpPr>
+      <p:grpSpPr>
+        <a:xfrm>
+          <a:off x="0" y="0"/>
+          <a:ext cx="0" cy="0"/>
+          <a:chOff x="0" y="0"/>
+          <a:chExt cx="0" cy="0"/>
+        </a:xfrm>
+      </p:grpSpPr>
+      <p:pic>
+        <p:nvPicPr>
+          <p:cNvPr id="2" name="Picture 1">
+            <a:extLst>
+              <a:ext uri="{FF2B5EF4-FFF2-40B4-BE49-F238E27FC236}">
+                <a16:creationId xmlns:a16="http://schemas.microsoft.com/office/drawing/2014/main" id="{DEADC67E-884E-C4D8-E005-9B4C70250733}"/>
+              </a:ext>
+            </a:extLst>
+          </p:cNvPr>
+          <p:cNvPicPr>
+            <a:picLocks noChangeAspect="1"/>
+          </p:cNvPicPr>
+          <p:nvPr/>
+        </p:nvPicPr>
+        <p:blipFill>
+          <a:blip r:embed="rId2"/>
+          <a:stretch>
+            <a:fillRect/>
+          </a:stretch>
+        </p:blipFill>
+        <p:spPr>
+          <a:xfrm>
+            <a:off x="63500" y="63500"/>
+            <a:ext cx="12192000" cy="484742"/>
+          </a:xfrm>
+          <a:prstGeom prst="rect">
+            <a:avLst/>
+          </a:prstGeom>
+        </p:spPr>
+      </p:pic>
+      <p:pic>
+        <p:nvPicPr>
+          <p:cNvPr id="3" name="Picture 2">
+            <a:extLst>
+              <a:ext uri="{FF2B5EF4-FFF2-40B4-BE49-F238E27FC236}">
+                <a16:creationId xmlns:a16="http://schemas.microsoft.com/office/drawing/2014/main" id="{12EE0DC6-D26E-F98D-75B8-EA8A52EC0B1B}"/>
+              </a:ext>
+            </a:extLst>
+          </p:cNvPr>
+          <p:cNvPicPr>
+            <a:picLocks noChangeAspect="1"/>
+          </p:cNvPicPr>
+          <p:nvPr/>
+        </p:nvPicPr>
+        <p:blipFill>
+          <a:blip r:embed="rId3"/>
+          <a:stretch>
+            <a:fillRect/>
+          </a:stretch>
+        </p:blipFill>
+        <p:spPr>
+          <a:xfrm>
+            <a:off x="63500" y="611742"/>
+            <a:ext cx="3590925" cy="590550"/>
+          </a:xfrm>
+          <a:prstGeom prst="rect">
+            <a:avLst/>
+          </a:prstGeom>
+        </p:spPr>
+      </p:pic>
+      <p:pic>
+        <p:nvPicPr>
+          <p:cNvPr id="4" name="Picture 3">
+            <a:extLst>
+              <a:ext uri="{FF2B5EF4-FFF2-40B4-BE49-F238E27FC236}">
+                <a16:creationId xmlns:a16="http://schemas.microsoft.com/office/drawing/2014/main" id="{92DAFD76-0534-CAFC-AF75-0AE2337AA0BE}"/>
+              </a:ext>
+            </a:extLst>
+          </p:cNvPr>
+          <p:cNvPicPr>
+            <a:picLocks noChangeAspect="1"/>
+          </p:cNvPicPr>
+          <p:nvPr/>
+        </p:nvPicPr>
+        <p:blipFill>
+          <a:blip r:embed="rId4"/>
+          <a:stretch>
+            <a:fillRect/>
+          </a:stretch>
+        </p:blipFill>
+        <p:spPr>
+          <a:xfrm>
+            <a:off x="63500" y="1265792"/>
+            <a:ext cx="1524000" cy="828675"/>
+          </a:xfrm>
+          <a:prstGeom prst="rect">
+            <a:avLst/>
+          </a:prstGeom>
+        </p:spPr>
+      </p:pic>
+      <p:pic>
+        <p:nvPicPr>
+          <p:cNvPr id="5" name="Picture 4">
+            <a:extLst>
+              <a:ext uri="{FF2B5EF4-FFF2-40B4-BE49-F238E27FC236}">
+                <a16:creationId xmlns:a16="http://schemas.microsoft.com/office/drawing/2014/main" id="{31766C40-E9E0-6EBA-571E-9934528591F0}"/>
+              </a:ext>
+            </a:extLst>
+          </p:cNvPr>
+          <p:cNvPicPr>
+            <a:picLocks noChangeAspect="1"/>
+          </p:cNvPicPr>
+          <p:nvPr/>
+        </p:nvPicPr>
+        <p:blipFill>
+          <a:blip r:embed="rId5"/>
+          <a:stretch>
+            <a:fillRect/>
+          </a:stretch>
+        </p:blipFill>
+        <p:spPr>
+          <a:xfrm>
+            <a:off x="63500" y="2157967"/>
+            <a:ext cx="2390775" cy="1362075"/>
+          </a:xfrm>
+          <a:prstGeom prst="rect">
+            <a:avLst/>
+          </a:prstGeom>
+        </p:spPr>
+      </p:pic>
+      <p:pic>
+        <p:nvPicPr>
+          <p:cNvPr id="6" name="Picture 5">
+            <a:extLst>
+              <a:ext uri="{FF2B5EF4-FFF2-40B4-BE49-F238E27FC236}">
+                <a16:creationId xmlns:a16="http://schemas.microsoft.com/office/drawing/2014/main" id="{6A84C9FC-5442-E09C-8A5D-3FBBE6BCC3BD}"/>
+              </a:ext>
+            </a:extLst>
+          </p:cNvPr>
+          <p:cNvPicPr>
+            <a:picLocks noChangeAspect="1"/>
+          </p:cNvPicPr>
+          <p:nvPr/>
+        </p:nvPicPr>
+        <p:blipFill>
+          <a:blip r:embed="rId6"/>
+          <a:stretch>
+            <a:fillRect/>
+          </a:stretch>
+        </p:blipFill>
+        <p:spPr>
+          <a:xfrm>
+            <a:off x="63500" y="3583542"/>
+            <a:ext cx="3409950" cy="2047875"/>
+          </a:xfrm>
+          <a:prstGeom prst="rect">
+            <a:avLst/>
+          </a:prstGeom>
+        </p:spPr>
+      </p:pic>
+      <p:pic>
+        <p:nvPicPr>
+          <p:cNvPr id="7" name="Picture 6">
+            <a:extLst>
+              <a:ext uri="{FF2B5EF4-FFF2-40B4-BE49-F238E27FC236}">
+                <a16:creationId xmlns:a16="http://schemas.microsoft.com/office/drawing/2014/main" id="{91D96EFF-E509-465C-2811-30B6C4142894}"/>
+              </a:ext>
+            </a:extLst>
+          </p:cNvPr>
+          <p:cNvPicPr>
+            <a:picLocks noChangeAspect="1"/>
+          </p:cNvPicPr>
+          <p:nvPr/>
+        </p:nvPicPr>
+        <p:blipFill>
+          <a:blip r:embed="rId7"/>
+          <a:stretch>
+            <a:fillRect/>
+          </a:stretch>
+        </p:blipFill>
+        <p:spPr>
+          <a:xfrm>
+            <a:off x="63500" y="5694917"/>
+            <a:ext cx="2409825" cy="1019175"/>
+          </a:xfrm>
+          <a:prstGeom prst="rect">
+            <a:avLst/>
+          </a:prstGeom>
+        </p:spPr>
+      </p:pic>
+    </p:spTree>
+    <p:extLst>
+      <p:ext uri="{BB962C8B-B14F-4D97-AF65-F5344CB8AC3E}">
+        <p14:creationId xmlns:p14="http://schemas.microsoft.com/office/powerpoint/2010/main" val="3386013850"/>
+      </p:ext>
+    </p:extLst>
+  </p:cSld>
+  <p:clrMapOvr>
+    <a:masterClrMapping/>
+  </p:clrMapOvr>
+</p:sld>
+</file>
+
+<file path=ppt/slides/slide43.xml><?xml version="1.0" encoding="utf-8"?>
+<p:sld xmlns:a="http://schemas.openxmlformats.org/drawingml/2006/main" xmlns:r="http://schemas.openxmlformats.org/officeDocument/2006/relationships" xmlns:p="http://schemas.openxmlformats.org/presentationml/2006/main">
+  <p:cSld>
+    <p:spTree>
+      <p:nvGrpSpPr>
+        <p:cNvPr id="1" name=""/>
+        <p:cNvGrpSpPr/>
+        <p:nvPr/>
+      </p:nvGrpSpPr>
+      <p:grpSpPr>
+        <a:xfrm>
+          <a:off x="0" y="0"/>
+          <a:ext cx="0" cy="0"/>
+          <a:chOff x="0" y="0"/>
+          <a:chExt cx="0" cy="0"/>
+        </a:xfrm>
+      </p:grpSpPr>
+      <p:pic>
+        <p:nvPicPr>
+          <p:cNvPr id="2" name="Picture 1">
+            <a:extLst>
+              <a:ext uri="{FF2B5EF4-FFF2-40B4-BE49-F238E27FC236}">
+                <a16:creationId xmlns:a16="http://schemas.microsoft.com/office/drawing/2014/main" id="{B761B294-A855-A8CF-4918-D63D5F062BB2}"/>
+              </a:ext>
+            </a:extLst>
+          </p:cNvPr>
+          <p:cNvPicPr>
+            <a:picLocks noChangeAspect="1"/>
+          </p:cNvPicPr>
+          <p:nvPr/>
+        </p:nvPicPr>
+        <p:blipFill>
+          <a:blip r:embed="rId2"/>
+          <a:stretch>
+            <a:fillRect/>
+          </a:stretch>
+        </p:blipFill>
+        <p:spPr>
+          <a:xfrm>
+            <a:off x="63500" y="63500"/>
+            <a:ext cx="3362325" cy="2219325"/>
+          </a:xfrm>
+          <a:prstGeom prst="rect">
+            <a:avLst/>
+          </a:prstGeom>
+        </p:spPr>
+      </p:pic>
+      <p:pic>
+        <p:nvPicPr>
+          <p:cNvPr id="3" name="Picture 2">
+            <a:extLst>
+              <a:ext uri="{FF2B5EF4-FFF2-40B4-BE49-F238E27FC236}">
+                <a16:creationId xmlns:a16="http://schemas.microsoft.com/office/drawing/2014/main" id="{DD626B23-4061-3A45-259A-3C15AF967732}"/>
+              </a:ext>
+            </a:extLst>
+          </p:cNvPr>
+          <p:cNvPicPr>
+            <a:picLocks noChangeAspect="1"/>
+          </p:cNvPicPr>
+          <p:nvPr/>
+        </p:nvPicPr>
+        <p:blipFill>
+          <a:blip r:embed="rId3"/>
+          <a:stretch>
+            <a:fillRect/>
+          </a:stretch>
+        </p:blipFill>
+        <p:spPr>
+          <a:xfrm>
+            <a:off x="63500" y="2346325"/>
+            <a:ext cx="4286250" cy="1285875"/>
+          </a:xfrm>
+          <a:prstGeom prst="rect">
+            <a:avLst/>
+          </a:prstGeom>
+        </p:spPr>
+      </p:pic>
+      <p:pic>
+        <p:nvPicPr>
+          <p:cNvPr id="4" name="Picture 3">
+            <a:extLst>
+              <a:ext uri="{FF2B5EF4-FFF2-40B4-BE49-F238E27FC236}">
+                <a16:creationId xmlns:a16="http://schemas.microsoft.com/office/drawing/2014/main" id="{D75BBAA7-5F5F-8F66-B24F-231126FBB236}"/>
+              </a:ext>
+            </a:extLst>
+          </p:cNvPr>
+          <p:cNvPicPr>
+            <a:picLocks noChangeAspect="1"/>
+          </p:cNvPicPr>
+          <p:nvPr/>
+        </p:nvPicPr>
+        <p:blipFill>
+          <a:blip r:embed="rId4"/>
+          <a:stretch>
+            <a:fillRect/>
+          </a:stretch>
+        </p:blipFill>
+        <p:spPr>
+          <a:xfrm>
+            <a:off x="63500" y="3695700"/>
+            <a:ext cx="3448050" cy="1752600"/>
+          </a:xfrm>
+          <a:prstGeom prst="rect">
+            <a:avLst/>
+          </a:prstGeom>
+        </p:spPr>
+      </p:pic>
+    </p:spTree>
+    <p:extLst>
+      <p:ext uri="{BB962C8B-B14F-4D97-AF65-F5344CB8AC3E}">
+        <p14:creationId xmlns:p14="http://schemas.microsoft.com/office/powerpoint/2010/main" val="483698364"/>
+      </p:ext>
+    </p:extLst>
+  </p:cSld>
+  <p:clrMapOvr>
+    <a:masterClrMapping/>
+  </p:clrMapOvr>
+</p:sld>
+</file>
+
+<file path=ppt/slides/slide44.xml><?xml version="1.0" encoding="utf-8"?>
+<p:sld xmlns:a="http://schemas.openxmlformats.org/drawingml/2006/main" xmlns:r="http://schemas.openxmlformats.org/officeDocument/2006/relationships" xmlns:p="http://schemas.openxmlformats.org/presentationml/2006/main">
+  <p:cSld>
+    <p:spTree>
+      <p:nvGrpSpPr>
+        <p:cNvPr id="1" name=""/>
+        <p:cNvGrpSpPr/>
+        <p:nvPr/>
+      </p:nvGrpSpPr>
+      <p:grpSpPr>
+        <a:xfrm>
+          <a:off x="0" y="0"/>
+          <a:ext cx="0" cy="0"/>
+          <a:chOff x="0" y="0"/>
+          <a:chExt cx="0" cy="0"/>
+        </a:xfrm>
+      </p:grpSpPr>
+      <p:pic>
+        <p:nvPicPr>
+          <p:cNvPr id="2" name="Picture 1">
+            <a:extLst>
+              <a:ext uri="{FF2B5EF4-FFF2-40B4-BE49-F238E27FC236}">
+                <a16:creationId xmlns:a16="http://schemas.microsoft.com/office/drawing/2014/main" id="{F5CF1F27-116C-BA41-8103-28B2F3C86A5A}"/>
+              </a:ext>
+            </a:extLst>
+          </p:cNvPr>
+          <p:cNvPicPr>
+            <a:picLocks noChangeAspect="1"/>
+          </p:cNvPicPr>
+          <p:nvPr/>
+        </p:nvPicPr>
+        <p:blipFill>
+          <a:blip r:embed="rId2"/>
+          <a:stretch>
+            <a:fillRect/>
+          </a:stretch>
+        </p:blipFill>
+        <p:spPr>
+          <a:xfrm>
+            <a:off x="63500" y="63500"/>
+            <a:ext cx="12192000" cy="484742"/>
+          </a:xfrm>
+          <a:prstGeom prst="rect">
+            <a:avLst/>
+          </a:prstGeom>
+        </p:spPr>
+      </p:pic>
+    </p:spTree>
+    <p:extLst>
+      <p:ext uri="{BB962C8B-B14F-4D97-AF65-F5344CB8AC3E}">
+        <p14:creationId xmlns:p14="http://schemas.microsoft.com/office/powerpoint/2010/main" val="854419137"/>
+      </p:ext>
+    </p:extLst>
+  </p:cSld>
+  <p:clrMapOvr>
+    <a:masterClrMapping/>
+  </p:clrMapOvr>
+</p:sld>
+</file>
+
+<file path=ppt/slides/slide45.xml><?xml version="1.0" encoding="utf-8"?>
+<p:sld xmlns:a="http://schemas.openxmlformats.org/drawingml/2006/main" xmlns:r="http://schemas.openxmlformats.org/officeDocument/2006/relationships" xmlns:p="http://schemas.openxmlformats.org/presentationml/2006/main">
+  <p:cSld>
+    <p:spTree>
+      <p:nvGrpSpPr>
+        <p:cNvPr id="1" name=""/>
+        <p:cNvGrpSpPr/>
+        <p:nvPr/>
+      </p:nvGrpSpPr>
+      <p:grpSpPr>
+        <a:xfrm>
+          <a:off x="0" y="0"/>
+          <a:ext cx="0" cy="0"/>
+          <a:chOff x="0" y="0"/>
+          <a:chExt cx="0" cy="0"/>
+        </a:xfrm>
+      </p:grpSpPr>
+      <p:pic>
+        <p:nvPicPr>
+          <p:cNvPr id="2" name="Picture 1">
+            <a:extLst>
+              <a:ext uri="{FF2B5EF4-FFF2-40B4-BE49-F238E27FC236}">
+                <a16:creationId xmlns:a16="http://schemas.microsoft.com/office/drawing/2014/main" id="{E7D0D453-C09B-A929-2B60-8B6421D6D6B1}"/>
+              </a:ext>
+            </a:extLst>
+          </p:cNvPr>
+          <p:cNvPicPr>
+            <a:picLocks noChangeAspect="1"/>
+          </p:cNvPicPr>
+          <p:nvPr/>
+        </p:nvPicPr>
+        <p:blipFill>
+          <a:blip r:embed="rId2"/>
+          <a:stretch>
+            <a:fillRect/>
+          </a:stretch>
+        </p:blipFill>
+        <p:spPr>
+          <a:xfrm>
+            <a:off x="63500" y="63500"/>
+            <a:ext cx="12079111" cy="6794500"/>
+          </a:xfrm>
+          <a:prstGeom prst="rect">
+            <a:avLst/>
+          </a:prstGeom>
+        </p:spPr>
+      </p:pic>
+    </p:spTree>
+    <p:extLst>
+      <p:ext uri="{BB962C8B-B14F-4D97-AF65-F5344CB8AC3E}">
+        <p14:creationId xmlns:p14="http://schemas.microsoft.com/office/powerpoint/2010/main" val="869242917"/>
+      </p:ext>
+    </p:extLst>
+  </p:cSld>
+  <p:clrMapOvr>
+    <a:masterClrMapping/>
+  </p:clrMapOvr>
+</p:sld>
+</file>
+
+<file path=ppt/slides/slide46.xml><?xml version="1.0" encoding="utf-8"?>
+<p:sld xmlns:a="http://schemas.openxmlformats.org/drawingml/2006/main" xmlns:r="http://schemas.openxmlformats.org/officeDocument/2006/relationships" xmlns:p="http://schemas.openxmlformats.org/presentationml/2006/main">
+  <p:cSld>
+    <p:spTree>
+      <p:nvGrpSpPr>
+        <p:cNvPr id="1" name=""/>
+        <p:cNvGrpSpPr/>
+        <p:nvPr/>
+      </p:nvGrpSpPr>
+      <p:grpSpPr>
+        <a:xfrm>
+          <a:off x="0" y="0"/>
+          <a:ext cx="0" cy="0"/>
+          <a:chOff x="0" y="0"/>
+          <a:chExt cx="0" cy="0"/>
+        </a:xfrm>
+      </p:grpSpPr>
+      <p:pic>
+        <p:nvPicPr>
+          <p:cNvPr id="2" name="Picture 1">
+            <a:extLst>
+              <a:ext uri="{FF2B5EF4-FFF2-40B4-BE49-F238E27FC236}">
+                <a16:creationId xmlns:a16="http://schemas.microsoft.com/office/drawing/2014/main" id="{4EB56CF7-3533-D904-AE38-BF442FB40D47}"/>
+              </a:ext>
+            </a:extLst>
+          </p:cNvPr>
+          <p:cNvPicPr>
+            <a:picLocks noChangeAspect="1"/>
+          </p:cNvPicPr>
+          <p:nvPr/>
+        </p:nvPicPr>
+        <p:blipFill>
+          <a:blip r:embed="rId2"/>
+          <a:stretch>
+            <a:fillRect/>
+          </a:stretch>
+        </p:blipFill>
+        <p:spPr>
+          <a:xfrm>
+            <a:off x="63500" y="63500"/>
+            <a:ext cx="12192000" cy="484742"/>
+          </a:xfrm>
+          <a:prstGeom prst="rect">
+            <a:avLst/>
+          </a:prstGeom>
+        </p:spPr>
+      </p:pic>
+    </p:spTree>
+    <p:extLst>
+      <p:ext uri="{BB962C8B-B14F-4D97-AF65-F5344CB8AC3E}">
+        <p14:creationId xmlns:p14="http://schemas.microsoft.com/office/powerpoint/2010/main" val="80901771"/>
+      </p:ext>
+    </p:extLst>
+  </p:cSld>
+  <p:clrMapOvr>
+    <a:masterClrMapping/>
+  </p:clrMapOvr>
+</p:sld>
+</file>
+
+<file path=ppt/slides/slide47.xml><?xml version="1.0" encoding="utf-8"?>
+<p:sld xmlns:a="http://schemas.openxmlformats.org/drawingml/2006/main" xmlns:r="http://schemas.openxmlformats.org/officeDocument/2006/relationships" xmlns:p="http://schemas.openxmlformats.org/presentationml/2006/main">
+  <p:cSld>
+    <p:spTree>
+      <p:nvGrpSpPr>
+        <p:cNvPr id="1" name=""/>
+        <p:cNvGrpSpPr/>
+        <p:nvPr/>
+      </p:nvGrpSpPr>
+      <p:grpSpPr>
+        <a:xfrm>
+          <a:off x="0" y="0"/>
+          <a:ext cx="0" cy="0"/>
+          <a:chOff x="0" y="0"/>
+          <a:chExt cx="0" cy="0"/>
+        </a:xfrm>
+      </p:grpSpPr>
+      <p:pic>
+        <p:nvPicPr>
+          <p:cNvPr id="2" name="Picture 1">
+            <a:extLst>
+              <a:ext uri="{FF2B5EF4-FFF2-40B4-BE49-F238E27FC236}">
+                <a16:creationId xmlns:a16="http://schemas.microsoft.com/office/drawing/2014/main" id="{142C5E6B-50A1-F32C-C2BE-698C1AFDF590}"/>
+              </a:ext>
+            </a:extLst>
+          </p:cNvPr>
+          <p:cNvPicPr>
+            <a:picLocks noChangeAspect="1"/>
+          </p:cNvPicPr>
+          <p:nvPr/>
+        </p:nvPicPr>
+        <p:blipFill>
+          <a:blip r:embed="rId2"/>
+          <a:stretch>
+            <a:fillRect/>
+          </a:stretch>
+        </p:blipFill>
+        <p:spPr>
+          <a:xfrm>
+            <a:off x="63500" y="63500"/>
+            <a:ext cx="12079111" cy="6794500"/>
+          </a:xfrm>
+          <a:prstGeom prst="rect">
+            <a:avLst/>
+          </a:prstGeom>
+        </p:spPr>
+      </p:pic>
+    </p:spTree>
+    <p:extLst>
+      <p:ext uri="{BB962C8B-B14F-4D97-AF65-F5344CB8AC3E}">
+        <p14:creationId xmlns:p14="http://schemas.microsoft.com/office/powerpoint/2010/main" val="4228983655"/>
       </p:ext>
     </p:extLst>
   </p:cSld>
@@ -13660,6 +15708,15 @@
 </file>
 
 <file path=customXml/item1.xml><?xml version="1.0" encoding="utf-8"?>
+<?mso-contentType ?>
+<FormTemplates xmlns="http://schemas.microsoft.com/sharepoint/v3/contenttype/forms">
+  <Display>DocumentLibraryForm</Display>
+  <Edit>DocumentLibraryForm</Edit>
+  <New>DocumentLibraryForm</New>
+</FormTemplates>
+</file>
+
+<file path=customXml/item2.xml><?xml version="1.0" encoding="utf-8"?>
 <p:properties xmlns:p="http://schemas.microsoft.com/office/2006/metadata/properties" xmlns:xsi="http://www.w3.org/2001/XMLSchema-instance" xmlns:pc="http://schemas.microsoft.com/office/infopath/2007/PartnerControls">
   <documentManagement>
     <_ip_UnifiedCompliancePolicyUIAction xmlns="http://schemas.microsoft.com/sharepoint/v3" xsi:nil="true"/>
@@ -13677,15 +15734,6 @@
     <MediaServiceKeyPoints xmlns="71af3243-3dd4-4a8d-8c0d-dd76da1f02a5" xsi:nil="true"/>
   </documentManagement>
 </p:properties>
-</file>
-
-<file path=customXml/item2.xml><?xml version="1.0" encoding="utf-8"?>
-<?mso-contentType ?>
-<FormTemplates xmlns="http://schemas.microsoft.com/sharepoint/v3/contenttype/forms">
-  <Display>DocumentLibraryForm</Display>
-  <Edit>DocumentLibraryForm</Edit>
-  <New>DocumentLibraryForm</New>
-</FormTemplates>
 </file>
 
 <file path=customXml/item3.xml><?xml version="1.0" encoding="utf-8"?>
@@ -14001,6 +16049,14 @@
 </file>
 
 <file path=customXml/itemProps1.xml><?xml version="1.0" encoding="utf-8"?>
+<ds:datastoreItem xmlns:ds="http://schemas.openxmlformats.org/officeDocument/2006/customXml" ds:itemID="{FABD9919-8F5A-4B99-83E1-E90FE1DCF2E1}">
+  <ds:schemaRefs>
+    <ds:schemaRef ds:uri="http://schemas.microsoft.com/sharepoint/v3/contenttype/forms"/>
+  </ds:schemaRefs>
+</ds:datastoreItem>
+</file>
+
+<file path=customXml/itemProps2.xml><?xml version="1.0" encoding="utf-8"?>
 <ds:datastoreItem xmlns:ds="http://schemas.openxmlformats.org/officeDocument/2006/customXml" ds:itemID="{80E87F72-70BF-43BC-A0D4-53665DC12672}">
   <ds:schemaRefs>
     <ds:schemaRef ds:uri="http://schemas.microsoft.com/office/2006/metadata/properties"/>
@@ -14008,14 +16064,6 @@
     <ds:schemaRef ds:uri="http://schemas.microsoft.com/sharepoint/v3"/>
     <ds:schemaRef ds:uri="71af3243-3dd4-4a8d-8c0d-dd76da1f02a5"/>
     <ds:schemaRef ds:uri="230e9df3-be65-4c73-a93b-d1236ebd677e"/>
-  </ds:schemaRefs>
-</ds:datastoreItem>
-</file>
-
-<file path=customXml/itemProps2.xml><?xml version="1.0" encoding="utf-8"?>
-<ds:datastoreItem xmlns:ds="http://schemas.openxmlformats.org/officeDocument/2006/customXml" ds:itemID="{FABD9919-8F5A-4B99-83E1-E90FE1DCF2E1}">
-  <ds:schemaRefs>
-    <ds:schemaRef ds:uri="http://schemas.microsoft.com/sharepoint/v3/contenttype/forms"/>
   </ds:schemaRefs>
 </ds:datastoreItem>
 </file>

</xml_diff>